<commit_message>
added suitable images for projects and moved skills sections to below about section on mobile view
</commit_message>
<xml_diff>
--- a/Presentation1.pptx
+++ b/Presentation1.pptx
@@ -262,7 +262,7 @@
           <a:p>
             <a:fld id="{ED49E505-A53C-477A-AD70-D02EC9F8ED69}" type="datetimeFigureOut">
               <a:rPr lang="en-IN" smtClean="0"/>
-              <a:t>03-02-2023</a:t>
+              <a:t>05-02-2023</a:t>
             </a:fld>
             <a:endParaRPr lang="en-IN"/>
           </a:p>
@@ -462,7 +462,7 @@
           <a:p>
             <a:fld id="{ED49E505-A53C-477A-AD70-D02EC9F8ED69}" type="datetimeFigureOut">
               <a:rPr lang="en-IN" smtClean="0"/>
-              <a:t>03-02-2023</a:t>
+              <a:t>05-02-2023</a:t>
             </a:fld>
             <a:endParaRPr lang="en-IN"/>
           </a:p>
@@ -672,7 +672,7 @@
           <a:p>
             <a:fld id="{ED49E505-A53C-477A-AD70-D02EC9F8ED69}" type="datetimeFigureOut">
               <a:rPr lang="en-IN" smtClean="0"/>
-              <a:t>03-02-2023</a:t>
+              <a:t>05-02-2023</a:t>
             </a:fld>
             <a:endParaRPr lang="en-IN"/>
           </a:p>
@@ -872,7 +872,7 @@
           <a:p>
             <a:fld id="{ED49E505-A53C-477A-AD70-D02EC9F8ED69}" type="datetimeFigureOut">
               <a:rPr lang="en-IN" smtClean="0"/>
-              <a:t>03-02-2023</a:t>
+              <a:t>05-02-2023</a:t>
             </a:fld>
             <a:endParaRPr lang="en-IN"/>
           </a:p>
@@ -1148,7 +1148,7 @@
           <a:p>
             <a:fld id="{ED49E505-A53C-477A-AD70-D02EC9F8ED69}" type="datetimeFigureOut">
               <a:rPr lang="en-IN" smtClean="0"/>
-              <a:t>03-02-2023</a:t>
+              <a:t>05-02-2023</a:t>
             </a:fld>
             <a:endParaRPr lang="en-IN"/>
           </a:p>
@@ -1416,7 +1416,7 @@
           <a:p>
             <a:fld id="{ED49E505-A53C-477A-AD70-D02EC9F8ED69}" type="datetimeFigureOut">
               <a:rPr lang="en-IN" smtClean="0"/>
-              <a:t>03-02-2023</a:t>
+              <a:t>05-02-2023</a:t>
             </a:fld>
             <a:endParaRPr lang="en-IN"/>
           </a:p>
@@ -1831,7 +1831,7 @@
           <a:p>
             <a:fld id="{ED49E505-A53C-477A-AD70-D02EC9F8ED69}" type="datetimeFigureOut">
               <a:rPr lang="en-IN" smtClean="0"/>
-              <a:t>03-02-2023</a:t>
+              <a:t>05-02-2023</a:t>
             </a:fld>
             <a:endParaRPr lang="en-IN"/>
           </a:p>
@@ -1973,7 +1973,7 @@
           <a:p>
             <a:fld id="{ED49E505-A53C-477A-AD70-D02EC9F8ED69}" type="datetimeFigureOut">
               <a:rPr lang="en-IN" smtClean="0"/>
-              <a:t>03-02-2023</a:t>
+              <a:t>05-02-2023</a:t>
             </a:fld>
             <a:endParaRPr lang="en-IN"/>
           </a:p>
@@ -2086,7 +2086,7 @@
           <a:p>
             <a:fld id="{ED49E505-A53C-477A-AD70-D02EC9F8ED69}" type="datetimeFigureOut">
               <a:rPr lang="en-IN" smtClean="0"/>
-              <a:t>03-02-2023</a:t>
+              <a:t>05-02-2023</a:t>
             </a:fld>
             <a:endParaRPr lang="en-IN"/>
           </a:p>
@@ -2399,7 +2399,7 @@
           <a:p>
             <a:fld id="{ED49E505-A53C-477A-AD70-D02EC9F8ED69}" type="datetimeFigureOut">
               <a:rPr lang="en-IN" smtClean="0"/>
-              <a:t>03-02-2023</a:t>
+              <a:t>05-02-2023</a:t>
             </a:fld>
             <a:endParaRPr lang="en-IN"/>
           </a:p>
@@ -2688,7 +2688,7 @@
           <a:p>
             <a:fld id="{ED49E505-A53C-477A-AD70-D02EC9F8ED69}" type="datetimeFigureOut">
               <a:rPr lang="en-IN" smtClean="0"/>
-              <a:t>03-02-2023</a:t>
+              <a:t>05-02-2023</a:t>
             </a:fld>
             <a:endParaRPr lang="en-IN"/>
           </a:p>
@@ -2931,7 +2931,7 @@
           <a:p>
             <a:fld id="{ED49E505-A53C-477A-AD70-D02EC9F8ED69}" type="datetimeFigureOut">
               <a:rPr lang="en-IN" smtClean="0"/>
-              <a:t>03-02-2023</a:t>
+              <a:t>05-02-2023</a:t>
             </a:fld>
             <a:endParaRPr lang="en-IN"/>
           </a:p>
@@ -3571,8 +3571,8 @@
         </p:nvCxnSpPr>
         <p:spPr>
           <a:xfrm flipH="1">
-            <a:off x="2873055" y="3717371"/>
-            <a:ext cx="1344984" cy="0"/>
+            <a:off x="2873055" y="3712066"/>
+            <a:ext cx="1464693" cy="5305"/>
           </a:xfrm>
           <a:prstGeom prst="straightConnector1">
             <a:avLst/>
@@ -3629,7 +3629,7 @@
         </p:blipFill>
         <p:spPr bwMode="auto">
           <a:xfrm>
-            <a:off x="896769" y="4639944"/>
+            <a:off x="5249639" y="5275672"/>
             <a:ext cx="1976286" cy="1265969"/>
           </a:xfrm>
           <a:prstGeom prst="rect">
@@ -3647,12 +3647,445 @@
           </a:extLst>
         </p:spPr>
       </p:pic>
+      <p:sp>
+        <p:nvSpPr>
+          <p:cNvPr id="29" name="TextBox 28">
+            <a:extLst>
+              <a:ext uri="{FF2B5EF4-FFF2-40B4-BE49-F238E27FC236}">
+                <a16:creationId xmlns:a16="http://schemas.microsoft.com/office/drawing/2014/main" id="{892F701D-179A-335A-044A-4F60305577F3}"/>
+              </a:ext>
+            </a:extLst>
+          </p:cNvPr>
+          <p:cNvSpPr txBox="1"/>
+          <p:nvPr/>
+        </p:nvSpPr>
+        <p:spPr>
+          <a:xfrm>
+            <a:off x="7413523" y="973394"/>
+            <a:ext cx="1807976" cy="369332"/>
+          </a:xfrm>
+          <a:prstGeom prst="rect">
+            <a:avLst/>
+          </a:prstGeom>
+          <a:noFill/>
+        </p:spPr>
+        <p:txBody>
+          <a:bodyPr wrap="square" rtlCol="0">
+            <a:spAutoFit/>
+          </a:bodyPr>
+          <a:lstStyle/>
+          <a:p>
+            <a:endParaRPr lang="en-IN" dirty="0"/>
+          </a:p>
+        </p:txBody>
+      </p:sp>
+      <p:sp>
+        <p:nvSpPr>
+          <p:cNvPr id="30" name="TextBox 29">
+            <a:extLst>
+              <a:ext uri="{FF2B5EF4-FFF2-40B4-BE49-F238E27FC236}">
+                <a16:creationId xmlns:a16="http://schemas.microsoft.com/office/drawing/2014/main" id="{57E5168C-A46D-537B-E9F6-0A16DFFF55CF}"/>
+              </a:ext>
+            </a:extLst>
+          </p:cNvPr>
+          <p:cNvSpPr txBox="1"/>
+          <p:nvPr/>
+        </p:nvSpPr>
+        <p:spPr>
+          <a:xfrm>
+            <a:off x="7179285" y="352129"/>
+            <a:ext cx="2892374" cy="954107"/>
+          </a:xfrm>
+          <a:prstGeom prst="rect">
+            <a:avLst/>
+          </a:prstGeom>
+          <a:noFill/>
+        </p:spPr>
+        <p:txBody>
+          <a:bodyPr wrap="square" rtlCol="0">
+            <a:spAutoFit/>
+          </a:bodyPr>
+          <a:lstStyle/>
+          <a:p>
+            <a:r>
+              <a:rPr lang="en-IN" sz="2800" dirty="0"/>
+              <a:t>       Web</a:t>
+            </a:r>
+          </a:p>
+          <a:p>
+            <a:r>
+              <a:rPr lang="en-IN" sz="2800" dirty="0"/>
+              <a:t> (Front-end)</a:t>
+            </a:r>
+          </a:p>
+        </p:txBody>
+      </p:sp>
+      <p:pic>
+        <p:nvPicPr>
+          <p:cNvPr id="1025" name="Picture 1024">
+            <a:extLst>
+              <a:ext uri="{FF2B5EF4-FFF2-40B4-BE49-F238E27FC236}">
+                <a16:creationId xmlns:a16="http://schemas.microsoft.com/office/drawing/2014/main" id="{45BD42A5-6F87-A273-DF0E-63AB5795A000}"/>
+              </a:ext>
+            </a:extLst>
+          </p:cNvPr>
+          <p:cNvPicPr>
+            <a:picLocks noChangeAspect="1"/>
+          </p:cNvPicPr>
+          <p:nvPr/>
+        </p:nvPicPr>
+        <p:blipFill>
+          <a:blip r:embed="rId6">
+            <a:extLst>
+              <a:ext uri="{28A0092B-C50C-407E-A947-70E740481C1C}">
+                <a14:useLocalDpi xmlns:a14="http://schemas.microsoft.com/office/drawing/2010/main" val="0"/>
+              </a:ext>
+            </a:extLst>
+          </a:blip>
+          <a:stretch>
+            <a:fillRect/>
+          </a:stretch>
+        </p:blipFill>
+        <p:spPr>
+          <a:xfrm>
+            <a:off x="4534127" y="3128961"/>
+            <a:ext cx="2980314" cy="1166210"/>
+          </a:xfrm>
+          <a:prstGeom prst="rect">
+            <a:avLst/>
+          </a:prstGeom>
+        </p:spPr>
+      </p:pic>
+      <p:sp>
+        <p:nvSpPr>
+          <p:cNvPr id="1027" name="TextBox 1026">
+            <a:extLst>
+              <a:ext uri="{FF2B5EF4-FFF2-40B4-BE49-F238E27FC236}">
+                <a16:creationId xmlns:a16="http://schemas.microsoft.com/office/drawing/2014/main" id="{ADE24BAA-30E1-CD86-3AA5-9E1A30EE07F7}"/>
+              </a:ext>
+            </a:extLst>
+          </p:cNvPr>
+          <p:cNvSpPr txBox="1"/>
+          <p:nvPr/>
+        </p:nvSpPr>
+        <p:spPr>
+          <a:xfrm>
+            <a:off x="3445422" y="4734608"/>
+            <a:ext cx="2792360" cy="954107"/>
+          </a:xfrm>
+          <a:prstGeom prst="rect">
+            <a:avLst/>
+          </a:prstGeom>
+          <a:noFill/>
+        </p:spPr>
+        <p:txBody>
+          <a:bodyPr wrap="square" rtlCol="0">
+            <a:spAutoFit/>
+          </a:bodyPr>
+          <a:lstStyle/>
+          <a:p>
+            <a:r>
+              <a:rPr lang="en-IN" sz="2800" dirty="0"/>
+              <a:t>Back-end</a:t>
+            </a:r>
+          </a:p>
+          <a:p>
+            <a:endParaRPr lang="en-IN" sz="2800" dirty="0"/>
+          </a:p>
+        </p:txBody>
+      </p:sp>
+      <p:grpSp>
+        <p:nvGrpSpPr>
+          <p:cNvPr id="19" name="Group 18">
+            <a:extLst>
+              <a:ext uri="{FF2B5EF4-FFF2-40B4-BE49-F238E27FC236}">
+                <a16:creationId xmlns:a16="http://schemas.microsoft.com/office/drawing/2014/main" id="{7D58B531-EB93-C793-6512-C6BF26512F8D}"/>
+              </a:ext>
+            </a:extLst>
+          </p:cNvPr>
+          <p:cNvGrpSpPr/>
+          <p:nvPr/>
+        </p:nvGrpSpPr>
+        <p:grpSpPr>
+          <a:xfrm>
+            <a:off x="2092290" y="1400034"/>
+            <a:ext cx="1474236" cy="1281654"/>
+            <a:chOff x="1212981" y="1585071"/>
+            <a:chExt cx="1474236" cy="1281654"/>
+          </a:xfrm>
+        </p:grpSpPr>
+        <p:pic>
+          <p:nvPicPr>
+            <p:cNvPr id="3" name="Picture 4">
+              <a:extLst>
+                <a:ext uri="{FF2B5EF4-FFF2-40B4-BE49-F238E27FC236}">
+                  <a16:creationId xmlns:a16="http://schemas.microsoft.com/office/drawing/2014/main" id="{E631E4C0-3672-80DF-6F86-AE336E0619DB}"/>
+                </a:ext>
+              </a:extLst>
+            </p:cNvPr>
+            <p:cNvPicPr>
+              <a:picLocks noChangeAspect="1" noChangeArrowheads="1"/>
+            </p:cNvPicPr>
+            <p:nvPr/>
+          </p:nvPicPr>
+          <p:blipFill>
+            <a:blip r:embed="rId7">
+              <a:extLst>
+                <a:ext uri="{28A0092B-C50C-407E-A947-70E740481C1C}">
+                  <a14:useLocalDpi xmlns:a14="http://schemas.microsoft.com/office/drawing/2010/main" val="0"/>
+                </a:ext>
+              </a:extLst>
+            </a:blip>
+            <a:srcRect/>
+            <a:stretch>
+              <a:fillRect/>
+            </a:stretch>
+          </p:blipFill>
+          <p:spPr bwMode="auto">
+            <a:xfrm>
+              <a:off x="1404758" y="1585071"/>
+              <a:ext cx="867747" cy="867747"/>
+            </a:xfrm>
+            <a:prstGeom prst="rect">
+              <a:avLst/>
+            </a:prstGeom>
+            <a:noFill/>
+            <a:extLst>
+              <a:ext uri="{909E8E84-426E-40DD-AFC4-6F175D3DCCD1}">
+                <a14:hiddenFill xmlns:a14="http://schemas.microsoft.com/office/drawing/2010/main">
+                  <a:solidFill>
+                    <a:srgbClr val="FFFFFF"/>
+                  </a:solidFill>
+                </a14:hiddenFill>
+              </a:ext>
+            </a:extLst>
+          </p:spPr>
+        </p:pic>
+        <p:sp>
+          <p:nvSpPr>
+            <p:cNvPr id="8" name="TextBox 7">
+              <a:extLst>
+                <a:ext uri="{FF2B5EF4-FFF2-40B4-BE49-F238E27FC236}">
+                  <a16:creationId xmlns:a16="http://schemas.microsoft.com/office/drawing/2014/main" id="{B3BF30EB-9C39-22DF-F6F3-E51DF0F88D09}"/>
+                </a:ext>
+              </a:extLst>
+            </p:cNvPr>
+            <p:cNvSpPr txBox="1"/>
+            <p:nvPr/>
+          </p:nvSpPr>
+          <p:spPr>
+            <a:xfrm>
+              <a:off x="1212981" y="2497393"/>
+              <a:ext cx="1474236" cy="369332"/>
+            </a:xfrm>
+            <a:prstGeom prst="rect">
+              <a:avLst/>
+            </a:prstGeom>
+            <a:noFill/>
+          </p:spPr>
+          <p:txBody>
+            <a:bodyPr wrap="square" rtlCol="0">
+              <a:spAutoFit/>
+            </a:bodyPr>
+            <a:lstStyle/>
+            <a:p>
+              <a:r>
+                <a:rPr lang="en-IN" dirty="0"/>
+                <a:t>Google Login</a:t>
+              </a:r>
+            </a:p>
+          </p:txBody>
+        </p:sp>
+      </p:grpSp>
+      <p:pic>
+        <p:nvPicPr>
+          <p:cNvPr id="4" name="Picture 4">
+            <a:extLst>
+              <a:ext uri="{FF2B5EF4-FFF2-40B4-BE49-F238E27FC236}">
+                <a16:creationId xmlns:a16="http://schemas.microsoft.com/office/drawing/2014/main" id="{14535EDC-BEA6-2378-3CEC-E5F0D42194DB}"/>
+              </a:ext>
+            </a:extLst>
+          </p:cNvPr>
+          <p:cNvPicPr>
+            <a:picLocks noChangeAspect="1" noChangeArrowheads="1"/>
+          </p:cNvPicPr>
+          <p:nvPr/>
+        </p:nvPicPr>
+        <p:blipFill>
+          <a:blip r:embed="rId8">
+            <a:extLst>
+              <a:ext uri="{28A0092B-C50C-407E-A947-70E740481C1C}">
+                <a14:useLocalDpi xmlns:a14="http://schemas.microsoft.com/office/drawing/2010/main" val="0"/>
+              </a:ext>
+            </a:extLst>
+          </a:blip>
+          <a:srcRect/>
+          <a:stretch>
+            <a:fillRect/>
+          </a:stretch>
+        </p:blipFill>
+        <p:spPr bwMode="auto">
+          <a:xfrm>
+            <a:off x="7098002" y="1545816"/>
+            <a:ext cx="1219509" cy="297732"/>
+          </a:xfrm>
+          <a:prstGeom prst="rect">
+            <a:avLst/>
+          </a:prstGeom>
+          <a:noFill/>
+          <a:extLst>
+            <a:ext uri="{909E8E84-426E-40DD-AFC4-6F175D3DCCD1}">
+              <a14:hiddenFill xmlns:a14="http://schemas.microsoft.com/office/drawing/2010/main">
+                <a:solidFill>
+                  <a:srgbClr val="FFFFFF"/>
+                </a:solidFill>
+              </a14:hiddenFill>
+            </a:ext>
+          </a:extLst>
+        </p:spPr>
+      </p:pic>
+      <p:pic>
+        <p:nvPicPr>
+          <p:cNvPr id="1032" name="Picture 8" descr="JavaScript Logo PNG Transparent – Brands Logos">
+            <a:extLst>
+              <a:ext uri="{FF2B5EF4-FFF2-40B4-BE49-F238E27FC236}">
+                <a16:creationId xmlns:a16="http://schemas.microsoft.com/office/drawing/2014/main" id="{CDF92850-CEE7-727C-23BF-51A4C54C8138}"/>
+              </a:ext>
+            </a:extLst>
+          </p:cNvPr>
+          <p:cNvPicPr>
+            <a:picLocks noChangeAspect="1" noChangeArrowheads="1"/>
+          </p:cNvPicPr>
+          <p:nvPr/>
+        </p:nvPicPr>
+        <p:blipFill>
+          <a:blip r:embed="rId9">
+            <a:extLst>
+              <a:ext uri="{28A0092B-C50C-407E-A947-70E740481C1C}">
+                <a14:useLocalDpi xmlns:a14="http://schemas.microsoft.com/office/drawing/2010/main" val="0"/>
+              </a:ext>
+            </a:extLst>
+          </a:blip>
+          <a:srcRect/>
+          <a:stretch>
+            <a:fillRect/>
+          </a:stretch>
+        </p:blipFill>
+        <p:spPr bwMode="auto">
+          <a:xfrm>
+            <a:off x="8625472" y="1456668"/>
+            <a:ext cx="449975" cy="449975"/>
+          </a:xfrm>
+          <a:prstGeom prst="rect">
+            <a:avLst/>
+          </a:prstGeom>
+          <a:noFill/>
+          <a:extLst>
+            <a:ext uri="{909E8E84-426E-40DD-AFC4-6F175D3DCCD1}">
+              <a14:hiddenFill xmlns:a14="http://schemas.microsoft.com/office/drawing/2010/main">
+                <a:solidFill>
+                  <a:srgbClr val="FFFFFF"/>
+                </a:solidFill>
+              </a14:hiddenFill>
+            </a:ext>
+          </a:extLst>
+        </p:spPr>
+      </p:pic>
+      <p:pic>
+        <p:nvPicPr>
+          <p:cNvPr id="2" name="Picture 10">
+            <a:extLst>
+              <a:ext uri="{FF2B5EF4-FFF2-40B4-BE49-F238E27FC236}">
+                <a16:creationId xmlns:a16="http://schemas.microsoft.com/office/drawing/2014/main" id="{E58C4D95-C532-06A7-1D92-CECAA19BADEC}"/>
+              </a:ext>
+            </a:extLst>
+          </p:cNvPr>
+          <p:cNvPicPr>
+            <a:picLocks noChangeAspect="1" noChangeArrowheads="1"/>
+          </p:cNvPicPr>
+          <p:nvPr/>
+        </p:nvPicPr>
+        <p:blipFill>
+          <a:blip r:embed="rId10">
+            <a:extLst>
+              <a:ext uri="{28A0092B-C50C-407E-A947-70E740481C1C}">
+                <a14:useLocalDpi xmlns:a14="http://schemas.microsoft.com/office/drawing/2010/main" val="0"/>
+              </a:ext>
+            </a:extLst>
+          </a:blip>
+          <a:srcRect/>
+          <a:stretch>
+            <a:fillRect/>
+          </a:stretch>
+        </p:blipFill>
+        <p:spPr bwMode="auto">
+          <a:xfrm>
+            <a:off x="8317511" y="4780566"/>
+            <a:ext cx="709255" cy="531942"/>
+          </a:xfrm>
+          <a:prstGeom prst="rect">
+            <a:avLst/>
+          </a:prstGeom>
+          <a:noFill/>
+          <a:extLst>
+            <a:ext uri="{909E8E84-426E-40DD-AFC4-6F175D3DCCD1}">
+              <a14:hiddenFill xmlns:a14="http://schemas.microsoft.com/office/drawing/2010/main">
+                <a:solidFill>
+                  <a:srgbClr val="FFFFFF"/>
+                </a:solidFill>
+              </a14:hiddenFill>
+            </a:ext>
+          </a:extLst>
+        </p:spPr>
+      </p:pic>
+      <p:sp>
+        <p:nvSpPr>
+          <p:cNvPr id="5" name="TextBox 4">
+            <a:extLst>
+              <a:ext uri="{FF2B5EF4-FFF2-40B4-BE49-F238E27FC236}">
+                <a16:creationId xmlns:a16="http://schemas.microsoft.com/office/drawing/2014/main" id="{ABAA112E-F75A-9C54-CE0A-DD94ABFA69E6}"/>
+              </a:ext>
+            </a:extLst>
+          </p:cNvPr>
+          <p:cNvSpPr txBox="1"/>
+          <p:nvPr/>
+        </p:nvSpPr>
+        <p:spPr>
+          <a:xfrm>
+            <a:off x="9233653" y="4983285"/>
+            <a:ext cx="2513254" cy="584775"/>
+          </a:xfrm>
+          <a:prstGeom prst="rect">
+            <a:avLst/>
+          </a:prstGeom>
+          <a:noFill/>
+        </p:spPr>
+        <p:txBody>
+          <a:bodyPr wrap="square" rtlCol="0">
+            <a:spAutoFit/>
+          </a:bodyPr>
+          <a:lstStyle/>
+          <a:p>
+            <a:r>
+              <a:rPr lang="en-IN" sz="1600" dirty="0"/>
+              <a:t>Password resets and alerts</a:t>
+            </a:r>
+            <a:br>
+              <a:rPr lang="en-IN" sz="1600" dirty="0"/>
+            </a:br>
+            <a:r>
+              <a:rPr lang="en-IN" sz="1600" dirty="0"/>
+              <a:t>JSON web tokens (JWT)</a:t>
+            </a:r>
+          </a:p>
+        </p:txBody>
+      </p:sp>
       <p:cxnSp>
         <p:nvCxnSpPr>
-          <p:cNvPr id="28" name="Straight Arrow Connector 27">
-            <a:extLst>
-              <a:ext uri="{FF2B5EF4-FFF2-40B4-BE49-F238E27FC236}">
-                <a16:creationId xmlns:a16="http://schemas.microsoft.com/office/drawing/2014/main" id="{2B14C934-A9DD-B7D8-BB8B-A1A528BEE072}"/>
+          <p:cNvPr id="7" name="Straight Arrow Connector 6">
+            <a:extLst>
+              <a:ext uri="{FF2B5EF4-FFF2-40B4-BE49-F238E27FC236}">
+                <a16:creationId xmlns:a16="http://schemas.microsoft.com/office/drawing/2014/main" id="{6537F416-FCFB-68F3-0F72-E666DE4D0873}"/>
               </a:ext>
             </a:extLst>
           </p:cNvPr>
@@ -3662,9 +4095,9 @@
           <p:nvPr/>
         </p:nvCxnSpPr>
         <p:spPr>
-          <a:xfrm flipH="1">
-            <a:off x="1816055" y="4059557"/>
-            <a:ext cx="15051" cy="455194"/>
+          <a:xfrm>
+            <a:off x="7713765" y="4287154"/>
+            <a:ext cx="474725" cy="479073"/>
           </a:xfrm>
           <a:prstGeom prst="straightConnector1">
             <a:avLst/>
@@ -3692,211 +4125,12 @@
           </a:fontRef>
         </p:style>
       </p:cxnSp>
-      <p:sp>
-        <p:nvSpPr>
-          <p:cNvPr id="29" name="TextBox 28">
-            <a:extLst>
-              <a:ext uri="{FF2B5EF4-FFF2-40B4-BE49-F238E27FC236}">
-                <a16:creationId xmlns:a16="http://schemas.microsoft.com/office/drawing/2014/main" id="{892F701D-179A-335A-044A-4F60305577F3}"/>
-              </a:ext>
-            </a:extLst>
-          </p:cNvPr>
-          <p:cNvSpPr txBox="1"/>
-          <p:nvPr/>
-        </p:nvSpPr>
-        <p:spPr>
-          <a:xfrm>
-            <a:off x="7413523" y="973394"/>
-            <a:ext cx="1807976" cy="369332"/>
-          </a:xfrm>
-          <a:prstGeom prst="rect">
-            <a:avLst/>
-          </a:prstGeom>
-          <a:noFill/>
-        </p:spPr>
-        <p:txBody>
-          <a:bodyPr wrap="square" rtlCol="0">
-            <a:spAutoFit/>
-          </a:bodyPr>
-          <a:lstStyle/>
-          <a:p>
-            <a:endParaRPr lang="en-IN" dirty="0"/>
-          </a:p>
-        </p:txBody>
-      </p:sp>
-      <p:sp>
-        <p:nvSpPr>
-          <p:cNvPr id="30" name="TextBox 29">
-            <a:extLst>
-              <a:ext uri="{FF2B5EF4-FFF2-40B4-BE49-F238E27FC236}">
-                <a16:creationId xmlns:a16="http://schemas.microsoft.com/office/drawing/2014/main" id="{57E5168C-A46D-537B-E9F6-0A16DFFF55CF}"/>
-              </a:ext>
-            </a:extLst>
-          </p:cNvPr>
-          <p:cNvSpPr txBox="1"/>
-          <p:nvPr/>
-        </p:nvSpPr>
-        <p:spPr>
-          <a:xfrm>
-            <a:off x="7179285" y="352129"/>
-            <a:ext cx="2892374" cy="954107"/>
-          </a:xfrm>
-          <a:prstGeom prst="rect">
-            <a:avLst/>
-          </a:prstGeom>
-          <a:noFill/>
-        </p:spPr>
-        <p:txBody>
-          <a:bodyPr wrap="square" rtlCol="0">
-            <a:spAutoFit/>
-          </a:bodyPr>
-          <a:lstStyle/>
-          <a:p>
-            <a:r>
-              <a:rPr lang="en-IN" sz="2800" dirty="0"/>
-              <a:t>       Web</a:t>
-            </a:r>
-          </a:p>
-          <a:p>
-            <a:r>
-              <a:rPr lang="en-IN" sz="2800" dirty="0"/>
-              <a:t> (Front-end)</a:t>
-            </a:r>
-          </a:p>
-        </p:txBody>
-      </p:sp>
-      <p:pic>
-        <p:nvPicPr>
-          <p:cNvPr id="1025" name="Picture 1024">
-            <a:extLst>
-              <a:ext uri="{FF2B5EF4-FFF2-40B4-BE49-F238E27FC236}">
-                <a16:creationId xmlns:a16="http://schemas.microsoft.com/office/drawing/2014/main" id="{45BD42A5-6F87-A273-DF0E-63AB5795A000}"/>
-              </a:ext>
-            </a:extLst>
-          </p:cNvPr>
-          <p:cNvPicPr>
-            <a:picLocks noChangeAspect="1"/>
-          </p:cNvPicPr>
-          <p:nvPr/>
-        </p:nvPicPr>
-        <p:blipFill>
-          <a:blip r:embed="rId6">
-            <a:extLst>
-              <a:ext uri="{28A0092B-C50C-407E-A947-70E740481C1C}">
-                <a14:useLocalDpi xmlns:a14="http://schemas.microsoft.com/office/drawing/2010/main" val="0"/>
-              </a:ext>
-            </a:extLst>
-          </a:blip>
-          <a:stretch>
-            <a:fillRect/>
-          </a:stretch>
-        </p:blipFill>
-        <p:spPr>
-          <a:xfrm>
-            <a:off x="4534127" y="3128961"/>
-            <a:ext cx="2980314" cy="1166210"/>
-          </a:xfrm>
-          <a:prstGeom prst="rect">
-            <a:avLst/>
-          </a:prstGeom>
-        </p:spPr>
-      </p:pic>
-      <p:sp>
-        <p:nvSpPr>
-          <p:cNvPr id="1027" name="TextBox 1026">
-            <a:extLst>
-              <a:ext uri="{FF2B5EF4-FFF2-40B4-BE49-F238E27FC236}">
-                <a16:creationId xmlns:a16="http://schemas.microsoft.com/office/drawing/2014/main" id="{ADE24BAA-30E1-CD86-3AA5-9E1A30EE07F7}"/>
-              </a:ext>
-            </a:extLst>
-          </p:cNvPr>
-          <p:cNvSpPr txBox="1"/>
-          <p:nvPr/>
-        </p:nvSpPr>
-        <p:spPr>
-          <a:xfrm>
-            <a:off x="5065915" y="4905756"/>
-            <a:ext cx="2792360" cy="523220"/>
-          </a:xfrm>
-          <a:prstGeom prst="rect">
-            <a:avLst/>
-          </a:prstGeom>
-          <a:noFill/>
-        </p:spPr>
-        <p:txBody>
-          <a:bodyPr wrap="square" rtlCol="0">
-            <a:spAutoFit/>
-          </a:bodyPr>
-          <a:lstStyle/>
-          <a:p>
-            <a:r>
-              <a:rPr lang="en-IN" sz="2800" dirty="0"/>
-              <a:t>Background</a:t>
-            </a:r>
-            <a:r>
-              <a:rPr lang="en-IN" dirty="0"/>
-              <a:t> </a:t>
-            </a:r>
-            <a:r>
-              <a:rPr lang="en-IN" sz="2800" dirty="0"/>
-              <a:t>Job</a:t>
-            </a:r>
-          </a:p>
-        </p:txBody>
-      </p:sp>
-      <p:pic>
-        <p:nvPicPr>
-          <p:cNvPr id="3" name="Picture 4">
-            <a:extLst>
-              <a:ext uri="{FF2B5EF4-FFF2-40B4-BE49-F238E27FC236}">
-                <a16:creationId xmlns:a16="http://schemas.microsoft.com/office/drawing/2014/main" id="{E631E4C0-3672-80DF-6F86-AE336E0619DB}"/>
-              </a:ext>
-            </a:extLst>
-          </p:cNvPr>
-          <p:cNvPicPr>
-            <a:picLocks noChangeAspect="1" noChangeArrowheads="1"/>
-          </p:cNvPicPr>
-          <p:nvPr/>
-        </p:nvPicPr>
-        <p:blipFill>
-          <a:blip r:embed="rId7">
-            <a:extLst>
-              <a:ext uri="{28A0092B-C50C-407E-A947-70E740481C1C}">
-                <a14:useLocalDpi xmlns:a14="http://schemas.microsoft.com/office/drawing/2010/main" val="0"/>
-              </a:ext>
-            </a:extLst>
-          </a:blip>
-          <a:srcRect/>
-          <a:stretch>
-            <a:fillRect/>
-          </a:stretch>
-        </p:blipFill>
-        <p:spPr bwMode="auto">
-          <a:xfrm>
-            <a:off x="1404758" y="1585071"/>
-            <a:ext cx="867747" cy="867747"/>
-          </a:xfrm>
-          <a:prstGeom prst="rect">
-            <a:avLst/>
-          </a:prstGeom>
-          <a:noFill/>
-          <a:extLst>
-            <a:ext uri="{909E8E84-426E-40DD-AFC4-6F175D3DCCD1}">
-              <a14:hiddenFill xmlns:a14="http://schemas.microsoft.com/office/drawing/2010/main">
-                <a:solidFill>
-                  <a:srgbClr val="FFFFFF"/>
-                </a:solidFill>
-              </a14:hiddenFill>
-            </a:ext>
-          </a:extLst>
-        </p:spPr>
-      </p:pic>
       <p:cxnSp>
         <p:nvCxnSpPr>
-          <p:cNvPr id="6" name="Straight Arrow Connector 5">
-            <a:extLst>
-              <a:ext uri="{FF2B5EF4-FFF2-40B4-BE49-F238E27FC236}">
-                <a16:creationId xmlns:a16="http://schemas.microsoft.com/office/drawing/2014/main" id="{72220AED-B91E-7018-0395-20D759F8EFA3}"/>
+          <p:cNvPr id="9" name="Straight Arrow Connector 8">
+            <a:extLst>
+              <a:ext uri="{FF2B5EF4-FFF2-40B4-BE49-F238E27FC236}">
+                <a16:creationId xmlns:a16="http://schemas.microsoft.com/office/drawing/2014/main" id="{CB431436-EDA6-2A14-7DD1-CEA35548DF11}"/>
               </a:ext>
             </a:extLst>
           </p:cNvPr>
@@ -3906,9 +4140,9 @@
           <p:nvPr/>
         </p:nvCxnSpPr>
         <p:spPr>
-          <a:xfrm>
-            <a:off x="1823581" y="2890684"/>
-            <a:ext cx="0" cy="473898"/>
+          <a:xfrm flipH="1" flipV="1">
+            <a:off x="3480318" y="2681688"/>
+            <a:ext cx="857430" cy="598561"/>
           </a:xfrm>
           <a:prstGeom prst="straightConnector1">
             <a:avLst/>
@@ -3936,12 +4170,57 @@
           </a:fontRef>
         </p:style>
       </p:cxnSp>
-      <p:sp>
-        <p:nvSpPr>
-          <p:cNvPr id="8" name="TextBox 7">
-            <a:extLst>
-              <a:ext uri="{FF2B5EF4-FFF2-40B4-BE49-F238E27FC236}">
-                <a16:creationId xmlns:a16="http://schemas.microsoft.com/office/drawing/2014/main" id="{B3BF30EB-9C39-22DF-F6F3-E51DF0F88D09}"/>
+      <p:cxnSp>
+        <p:nvCxnSpPr>
+          <p:cNvPr id="13" name="Straight Arrow Connector 12">
+            <a:extLst>
+              <a:ext uri="{FF2B5EF4-FFF2-40B4-BE49-F238E27FC236}">
+                <a16:creationId xmlns:a16="http://schemas.microsoft.com/office/drawing/2014/main" id="{4B5FA707-4E47-3EE1-F030-54DF9F89CC8A}"/>
+              </a:ext>
+            </a:extLst>
+          </p:cNvPr>
+          <p:cNvCxnSpPr>
+            <a:cxnSpLocks/>
+          </p:cNvCxnSpPr>
+          <p:nvPr/>
+        </p:nvCxnSpPr>
+        <p:spPr>
+          <a:xfrm>
+            <a:off x="6126277" y="4457777"/>
+            <a:ext cx="0" cy="748125"/>
+          </a:xfrm>
+          <a:prstGeom prst="straightConnector1">
+            <a:avLst/>
+          </a:prstGeom>
+          <a:ln>
+            <a:solidFill>
+              <a:schemeClr val="tx1"/>
+            </a:solidFill>
+            <a:headEnd type="triangle"/>
+            <a:tailEnd type="triangle"/>
+          </a:ln>
+        </p:spPr>
+        <p:style>
+          <a:lnRef idx="1">
+            <a:schemeClr val="accent1"/>
+          </a:lnRef>
+          <a:fillRef idx="0">
+            <a:schemeClr val="accent1"/>
+          </a:fillRef>
+          <a:effectRef idx="0">
+            <a:schemeClr val="accent1"/>
+          </a:effectRef>
+          <a:fontRef idx="minor">
+            <a:schemeClr val="tx1"/>
+          </a:fontRef>
+        </p:style>
+      </p:cxnSp>
+      <p:sp>
+        <p:nvSpPr>
+          <p:cNvPr id="1024" name="TextBox 1023">
+            <a:extLst>
+              <a:ext uri="{FF2B5EF4-FFF2-40B4-BE49-F238E27FC236}">
+                <a16:creationId xmlns:a16="http://schemas.microsoft.com/office/drawing/2014/main" id="{CDD2E62A-8643-8E02-2040-34AC0E37C506}"/>
               </a:ext>
             </a:extLst>
           </p:cNvPr>
@@ -3950,8 +4229,8 @@
         </p:nvSpPr>
         <p:spPr>
           <a:xfrm>
-            <a:off x="1212981" y="2497393"/>
-            <a:ext cx="1474236" cy="369332"/>
+            <a:off x="631820" y="5581954"/>
+            <a:ext cx="2266564" cy="338554"/>
           </a:xfrm>
           <a:prstGeom prst="rect">
             <a:avLst/>
@@ -3965,18 +4244,18 @@
           <a:lstStyle/>
           <a:p>
             <a:r>
-              <a:rPr lang="en-IN" dirty="0"/>
-              <a:t>Google Login</a:t>
+              <a:rPr lang="en-IN" sz="1600" dirty="0"/>
+              <a:t>Continuous deployment</a:t>
             </a:r>
           </a:p>
         </p:txBody>
       </p:sp>
       <p:pic>
         <p:nvPicPr>
-          <p:cNvPr id="4" name="Picture 4">
-            <a:extLst>
-              <a:ext uri="{FF2B5EF4-FFF2-40B4-BE49-F238E27FC236}">
-                <a16:creationId xmlns:a16="http://schemas.microsoft.com/office/drawing/2014/main" id="{14535EDC-BEA6-2378-3CEC-E5F0D42194DB}"/>
+          <p:cNvPr id="1029" name="Picture 4" descr="GitHub logo PNG transparent image download, size: 1125x417px">
+            <a:extLst>
+              <a:ext uri="{FF2B5EF4-FFF2-40B4-BE49-F238E27FC236}">
+                <a16:creationId xmlns:a16="http://schemas.microsoft.com/office/drawing/2014/main" id="{066E9CF5-78F0-9226-41F7-B9AAC246318D}"/>
               </a:ext>
             </a:extLst>
           </p:cNvPr>
@@ -3986,7 +4265,7 @@
           <p:nvPr/>
         </p:nvPicPr>
         <p:blipFill>
-          <a:blip r:embed="rId8">
+          <a:blip r:embed="rId11">
             <a:extLst>
               <a:ext uri="{28A0092B-C50C-407E-A947-70E740481C1C}">
                 <a14:useLocalDpi xmlns:a14="http://schemas.microsoft.com/office/drawing/2010/main" val="0"/>
@@ -4000,8 +4279,8 @@
         </p:blipFill>
         <p:spPr bwMode="auto">
           <a:xfrm>
-            <a:off x="7098002" y="1545816"/>
-            <a:ext cx="1219509" cy="297732"/>
+            <a:off x="371798" y="4674859"/>
+            <a:ext cx="2526586" cy="907095"/>
           </a:xfrm>
           <a:prstGeom prst="rect">
             <a:avLst/>
@@ -4018,12 +4297,57 @@
           </a:extLst>
         </p:spPr>
       </p:pic>
+      <p:cxnSp>
+        <p:nvCxnSpPr>
+          <p:cNvPr id="1030" name="Straight Arrow Connector 1029">
+            <a:extLst>
+              <a:ext uri="{FF2B5EF4-FFF2-40B4-BE49-F238E27FC236}">
+                <a16:creationId xmlns:a16="http://schemas.microsoft.com/office/drawing/2014/main" id="{BFD62236-46B8-5C5F-9563-7AC7D7D7313E}"/>
+              </a:ext>
+            </a:extLst>
+          </p:cNvPr>
+          <p:cNvCxnSpPr>
+            <a:cxnSpLocks/>
+          </p:cNvCxnSpPr>
+          <p:nvPr/>
+        </p:nvCxnSpPr>
+        <p:spPr>
+          <a:xfrm>
+            <a:off x="1631065" y="4098386"/>
+            <a:ext cx="0" cy="541515"/>
+          </a:xfrm>
+          <a:prstGeom prst="straightConnector1">
+            <a:avLst/>
+          </a:prstGeom>
+          <a:ln>
+            <a:solidFill>
+              <a:schemeClr val="tx1"/>
+            </a:solidFill>
+            <a:headEnd type="triangle"/>
+            <a:tailEnd type="triangle"/>
+          </a:ln>
+        </p:spPr>
+        <p:style>
+          <a:lnRef idx="1">
+            <a:schemeClr val="accent1"/>
+          </a:lnRef>
+          <a:fillRef idx="0">
+            <a:schemeClr val="accent1"/>
+          </a:fillRef>
+          <a:effectRef idx="0">
+            <a:schemeClr val="accent1"/>
+          </a:effectRef>
+          <a:fontRef idx="minor">
+            <a:schemeClr val="tx1"/>
+          </a:fontRef>
+        </p:style>
+      </p:cxnSp>
       <p:pic>
         <p:nvPicPr>
-          <p:cNvPr id="1032" name="Picture 8" descr="JavaScript Logo PNG Transparent – Brands Logos">
-            <a:extLst>
-              <a:ext uri="{FF2B5EF4-FFF2-40B4-BE49-F238E27FC236}">
-                <a16:creationId xmlns:a16="http://schemas.microsoft.com/office/drawing/2014/main" id="{CDF92850-CEE7-727C-23BF-51A4C54C8138}"/>
+          <p:cNvPr id="1035" name="Picture 4">
+            <a:extLst>
+              <a:ext uri="{FF2B5EF4-FFF2-40B4-BE49-F238E27FC236}">
+                <a16:creationId xmlns:a16="http://schemas.microsoft.com/office/drawing/2014/main" id="{41CAD563-5CF6-0EEC-AD6F-2C445128B3E1}"/>
               </a:ext>
             </a:extLst>
           </p:cNvPr>
@@ -4033,7 +4357,7 @@
           <p:nvPr/>
         </p:nvPicPr>
         <p:blipFill>
-          <a:blip r:embed="rId9">
+          <a:blip r:embed="rId12">
             <a:extLst>
               <a:ext uri="{28A0092B-C50C-407E-A947-70E740481C1C}">
                 <a14:useLocalDpi xmlns:a14="http://schemas.microsoft.com/office/drawing/2010/main" val="0"/>
@@ -4047,8 +4371,8 @@
         </p:blipFill>
         <p:spPr bwMode="auto">
           <a:xfrm>
-            <a:off x="8625472" y="1456668"/>
-            <a:ext cx="449975" cy="449975"/>
+            <a:off x="9352343" y="1359867"/>
+            <a:ext cx="1482482" cy="592992"/>
           </a:xfrm>
           <a:prstGeom prst="rect">
             <a:avLst/>
@@ -4420,41 +4744,6 @@
           </a:prstGeom>
         </p:spPr>
       </p:pic>
-      <p:sp>
-        <p:nvSpPr>
-          <p:cNvPr id="1027" name="TextBox 1026">
-            <a:extLst>
-              <a:ext uri="{FF2B5EF4-FFF2-40B4-BE49-F238E27FC236}">
-                <a16:creationId xmlns:a16="http://schemas.microsoft.com/office/drawing/2014/main" id="{ADE24BAA-30E1-CD86-3AA5-9E1A30EE07F7}"/>
-              </a:ext>
-            </a:extLst>
-          </p:cNvPr>
-          <p:cNvSpPr txBox="1"/>
-          <p:nvPr/>
-        </p:nvSpPr>
-        <p:spPr>
-          <a:xfrm>
-            <a:off x="778854" y="5993888"/>
-            <a:ext cx="2189624" cy="338554"/>
-          </a:xfrm>
-          <a:prstGeom prst="rect">
-            <a:avLst/>
-          </a:prstGeom>
-          <a:noFill/>
-        </p:spPr>
-        <p:txBody>
-          <a:bodyPr wrap="square" rtlCol="0">
-            <a:spAutoFit/>
-          </a:bodyPr>
-          <a:lstStyle/>
-          <a:p>
-            <a:r>
-              <a:rPr lang="en-IN" sz="1600" dirty="0"/>
-              <a:t>Continuous deployment</a:t>
-            </a:r>
-          </a:p>
-        </p:txBody>
-      </p:sp>
       <p:pic>
         <p:nvPicPr>
           <p:cNvPr id="2050" name="Picture 2" descr="SQLite Reviews &amp; Ratings 2023">
@@ -4631,12 +4920,160 @@
           </a:extLst>
         </p:spPr>
       </p:pic>
+      <p:grpSp>
+        <p:nvGrpSpPr>
+          <p:cNvPr id="3" name="Group 2">
+            <a:extLst>
+              <a:ext uri="{FF2B5EF4-FFF2-40B4-BE49-F238E27FC236}">
+                <a16:creationId xmlns:a16="http://schemas.microsoft.com/office/drawing/2014/main" id="{7AA2702B-C7F4-F50C-04C7-76C7F2D720E6}"/>
+              </a:ext>
+            </a:extLst>
+          </p:cNvPr>
+          <p:cNvGrpSpPr/>
+          <p:nvPr/>
+        </p:nvGrpSpPr>
+        <p:grpSpPr>
+          <a:xfrm>
+            <a:off x="313814" y="4119175"/>
+            <a:ext cx="3129678" cy="2213267"/>
+            <a:chOff x="313814" y="4119175"/>
+            <a:chExt cx="3129678" cy="2213267"/>
+          </a:xfrm>
+        </p:grpSpPr>
+        <p:sp>
+          <p:nvSpPr>
+            <p:cNvPr id="1027" name="TextBox 1026">
+              <a:extLst>
+                <a:ext uri="{FF2B5EF4-FFF2-40B4-BE49-F238E27FC236}">
+                  <a16:creationId xmlns:a16="http://schemas.microsoft.com/office/drawing/2014/main" id="{ADE24BAA-30E1-CD86-3AA5-9E1A30EE07F7}"/>
+                </a:ext>
+              </a:extLst>
+            </p:cNvPr>
+            <p:cNvSpPr txBox="1"/>
+            <p:nvPr/>
+          </p:nvSpPr>
+          <p:spPr>
+            <a:xfrm>
+              <a:off x="778854" y="5993888"/>
+              <a:ext cx="2189624" cy="338554"/>
+            </a:xfrm>
+            <a:prstGeom prst="rect">
+              <a:avLst/>
+            </a:prstGeom>
+            <a:noFill/>
+          </p:spPr>
+          <p:txBody>
+            <a:bodyPr wrap="square" rtlCol="0">
+              <a:spAutoFit/>
+            </a:bodyPr>
+            <a:lstStyle/>
+            <a:p>
+              <a:r>
+                <a:rPr lang="en-IN" sz="1600" dirty="0"/>
+                <a:t>Continuous deployment</a:t>
+              </a:r>
+            </a:p>
+          </p:txBody>
+        </p:sp>
+        <p:pic>
+          <p:nvPicPr>
+            <p:cNvPr id="2052" name="Picture 4" descr="GitHub logo PNG transparent image download, size: 1125x417px">
+              <a:extLst>
+                <a:ext uri="{FF2B5EF4-FFF2-40B4-BE49-F238E27FC236}">
+                  <a16:creationId xmlns:a16="http://schemas.microsoft.com/office/drawing/2014/main" id="{54CB6685-F26F-EE00-C857-411F8AAA311B}"/>
+                </a:ext>
+              </a:extLst>
+            </p:cNvPr>
+            <p:cNvPicPr>
+              <a:picLocks noChangeAspect="1" noChangeArrowheads="1"/>
+            </p:cNvPicPr>
+            <p:nvPr/>
+          </p:nvPicPr>
+          <p:blipFill>
+            <a:blip r:embed="rId8">
+              <a:extLst>
+                <a:ext uri="{28A0092B-C50C-407E-A947-70E740481C1C}">
+                  <a14:useLocalDpi xmlns:a14="http://schemas.microsoft.com/office/drawing/2010/main" val="0"/>
+                </a:ext>
+              </a:extLst>
+            </a:blip>
+            <a:srcRect/>
+            <a:stretch>
+              <a:fillRect/>
+            </a:stretch>
+          </p:blipFill>
+          <p:spPr bwMode="auto">
+            <a:xfrm>
+              <a:off x="313814" y="4852233"/>
+              <a:ext cx="3129678" cy="1153486"/>
+            </a:xfrm>
+            <a:prstGeom prst="rect">
+              <a:avLst/>
+            </a:prstGeom>
+            <a:noFill/>
+            <a:extLst>
+              <a:ext uri="{909E8E84-426E-40DD-AFC4-6F175D3DCCD1}">
+                <a14:hiddenFill xmlns:a14="http://schemas.microsoft.com/office/drawing/2010/main">
+                  <a:solidFill>
+                    <a:srgbClr val="FFFFFF"/>
+                  </a:solidFill>
+                </a14:hiddenFill>
+              </a:ext>
+            </a:extLst>
+          </p:spPr>
+        </p:pic>
+        <p:cxnSp>
+          <p:nvCxnSpPr>
+            <p:cNvPr id="7" name="Straight Arrow Connector 6">
+              <a:extLst>
+                <a:ext uri="{FF2B5EF4-FFF2-40B4-BE49-F238E27FC236}">
+                  <a16:creationId xmlns:a16="http://schemas.microsoft.com/office/drawing/2014/main" id="{E743BEE9-0523-C837-1D7F-2C539D63D530}"/>
+                </a:ext>
+              </a:extLst>
+            </p:cNvPr>
+            <p:cNvCxnSpPr>
+              <a:cxnSpLocks/>
+            </p:cNvCxnSpPr>
+            <p:nvPr/>
+          </p:nvCxnSpPr>
+          <p:spPr>
+            <a:xfrm>
+              <a:off x="1873666" y="4119175"/>
+              <a:ext cx="0" cy="688605"/>
+            </a:xfrm>
+            <a:prstGeom prst="straightConnector1">
+              <a:avLst/>
+            </a:prstGeom>
+            <a:ln>
+              <a:solidFill>
+                <a:schemeClr val="tx1"/>
+              </a:solidFill>
+              <a:headEnd type="triangle"/>
+              <a:tailEnd type="triangle"/>
+            </a:ln>
+          </p:spPr>
+          <p:style>
+            <a:lnRef idx="1">
+              <a:schemeClr val="accent1"/>
+            </a:lnRef>
+            <a:fillRef idx="0">
+              <a:schemeClr val="accent1"/>
+            </a:fillRef>
+            <a:effectRef idx="0">
+              <a:schemeClr val="accent1"/>
+            </a:effectRef>
+            <a:fontRef idx="minor">
+              <a:schemeClr val="tx1"/>
+            </a:fontRef>
+          </p:style>
+        </p:cxnSp>
+      </p:grpSp>
       <p:pic>
         <p:nvPicPr>
-          <p:cNvPr id="2052" name="Picture 4" descr="GitHub logo PNG transparent image download, size: 1125x417px">
-            <a:extLst>
-              <a:ext uri="{FF2B5EF4-FFF2-40B4-BE49-F238E27FC236}">
-                <a16:creationId xmlns:a16="http://schemas.microsoft.com/office/drawing/2014/main" id="{54CB6685-F26F-EE00-C857-411F8AAA311B}"/>
+          <p:cNvPr id="2054" name="Picture 6" descr="Rapid">
+            <a:extLst>
+              <a:ext uri="{FF2B5EF4-FFF2-40B4-BE49-F238E27FC236}">
+                <a16:creationId xmlns:a16="http://schemas.microsoft.com/office/drawing/2014/main" id="{67563C50-10E6-B9AF-F92B-71FE3E0DBFD4}"/>
               </a:ext>
             </a:extLst>
           </p:cNvPr>
@@ -4646,7 +5083,7 @@
           <p:nvPr/>
         </p:nvPicPr>
         <p:blipFill>
-          <a:blip r:embed="rId8">
+          <a:blip r:embed="rId9">
             <a:extLst>
               <a:ext uri="{28A0092B-C50C-407E-A947-70E740481C1C}">
                 <a14:useLocalDpi xmlns:a14="http://schemas.microsoft.com/office/drawing/2010/main" val="0"/>
@@ -4660,8 +5097,8 @@
         </p:blipFill>
         <p:spPr bwMode="auto">
           <a:xfrm>
-            <a:off x="313814" y="4852233"/>
-            <a:ext cx="3129678" cy="1153486"/>
+            <a:off x="5183932" y="5227838"/>
+            <a:ext cx="2189624" cy="605095"/>
           </a:xfrm>
           <a:prstGeom prst="rect">
             <a:avLst/>
@@ -4680,10 +5117,10 @@
       </p:pic>
       <p:cxnSp>
         <p:nvCxnSpPr>
-          <p:cNvPr id="7" name="Straight Arrow Connector 6">
-            <a:extLst>
-              <a:ext uri="{FF2B5EF4-FFF2-40B4-BE49-F238E27FC236}">
-                <a16:creationId xmlns:a16="http://schemas.microsoft.com/office/drawing/2014/main" id="{E743BEE9-0523-C837-1D7F-2C539D63D530}"/>
+          <p:cNvPr id="10" name="Straight Arrow Connector 9">
+            <a:extLst>
+              <a:ext uri="{FF2B5EF4-FFF2-40B4-BE49-F238E27FC236}">
+                <a16:creationId xmlns:a16="http://schemas.microsoft.com/office/drawing/2014/main" id="{3B8A7F9A-0B3D-C0B8-05F7-FC6C7185004E}"/>
               </a:ext>
             </a:extLst>
           </p:cNvPr>
@@ -4694,8 +5131,8 @@
         </p:nvCxnSpPr>
         <p:spPr>
           <a:xfrm>
-            <a:off x="1873666" y="4119175"/>
-            <a:ext cx="0" cy="688605"/>
+            <a:off x="6100010" y="4358399"/>
+            <a:ext cx="0" cy="542725"/>
           </a:xfrm>
           <a:prstGeom prst="straightConnector1">
             <a:avLst/>
@@ -4723,12 +5160,47 @@
           </a:fontRef>
         </p:style>
       </p:cxnSp>
+      <p:sp>
+        <p:nvSpPr>
+          <p:cNvPr id="12" name="TextBox 11">
+            <a:extLst>
+              <a:ext uri="{FF2B5EF4-FFF2-40B4-BE49-F238E27FC236}">
+                <a16:creationId xmlns:a16="http://schemas.microsoft.com/office/drawing/2014/main" id="{C58C08AB-7977-05B9-B8B5-6108A7AA5B5C}"/>
+              </a:ext>
+            </a:extLst>
+          </p:cNvPr>
+          <p:cNvSpPr txBox="1"/>
+          <p:nvPr/>
+        </p:nvSpPr>
+        <p:spPr>
+          <a:xfrm>
+            <a:off x="5183932" y="5836442"/>
+            <a:ext cx="2513254" cy="338554"/>
+          </a:xfrm>
+          <a:prstGeom prst="rect">
+            <a:avLst/>
+          </a:prstGeom>
+          <a:noFill/>
+        </p:spPr>
+        <p:txBody>
+          <a:bodyPr wrap="square" rtlCol="0">
+            <a:spAutoFit/>
+          </a:bodyPr>
+          <a:lstStyle/>
+          <a:p>
+            <a:r>
+              <a:rPr lang="en-IN" sz="1600" dirty="0"/>
+              <a:t>Grammar check in reports</a:t>
+            </a:r>
+          </a:p>
+        </p:txBody>
+      </p:sp>
       <p:pic>
         <p:nvPicPr>
-          <p:cNvPr id="2054" name="Picture 6" descr="Rapid">
-            <a:extLst>
-              <a:ext uri="{FF2B5EF4-FFF2-40B4-BE49-F238E27FC236}">
-                <a16:creationId xmlns:a16="http://schemas.microsoft.com/office/drawing/2014/main" id="{67563C50-10E6-B9AF-F92B-71FE3E0DBFD4}"/>
+          <p:cNvPr id="2058" name="Picture 10">
+            <a:extLst>
+              <a:ext uri="{FF2B5EF4-FFF2-40B4-BE49-F238E27FC236}">
+                <a16:creationId xmlns:a16="http://schemas.microsoft.com/office/drawing/2014/main" id="{68B658F5-F6C0-48DB-63B9-266A97F5CD12}"/>
               </a:ext>
             </a:extLst>
           </p:cNvPr>
@@ -4738,7 +5210,7 @@
           <p:nvPr/>
         </p:nvPicPr>
         <p:blipFill>
-          <a:blip r:embed="rId9">
+          <a:blip r:embed="rId10">
             <a:extLst>
               <a:ext uri="{28A0092B-C50C-407E-A947-70E740481C1C}">
                 <a14:useLocalDpi xmlns:a14="http://schemas.microsoft.com/office/drawing/2010/main" val="0"/>
@@ -4752,8 +5224,8 @@
         </p:blipFill>
         <p:spPr bwMode="auto">
           <a:xfrm>
-            <a:off x="5183932" y="5227838"/>
-            <a:ext cx="2189624" cy="605095"/>
+            <a:off x="8192081" y="4962998"/>
+            <a:ext cx="709255" cy="531942"/>
           </a:xfrm>
           <a:prstGeom prst="rect">
             <a:avLst/>
@@ -4772,10 +5244,10 @@
       </p:pic>
       <p:cxnSp>
         <p:nvCxnSpPr>
-          <p:cNvPr id="10" name="Straight Arrow Connector 9">
-            <a:extLst>
-              <a:ext uri="{FF2B5EF4-FFF2-40B4-BE49-F238E27FC236}">
-                <a16:creationId xmlns:a16="http://schemas.microsoft.com/office/drawing/2014/main" id="{3B8A7F9A-0B3D-C0B8-05F7-FC6C7185004E}"/>
+          <p:cNvPr id="13" name="Straight Arrow Connector 12">
+            <a:extLst>
+              <a:ext uri="{FF2B5EF4-FFF2-40B4-BE49-F238E27FC236}">
+                <a16:creationId xmlns:a16="http://schemas.microsoft.com/office/drawing/2014/main" id="{4F57BE37-BC69-B1CB-F412-040D03D6E708}"/>
               </a:ext>
             </a:extLst>
           </p:cNvPr>
@@ -4786,8 +5258,8 @@
         </p:nvCxnSpPr>
         <p:spPr>
           <a:xfrm>
-            <a:off x="6100010" y="4358399"/>
-            <a:ext cx="0" cy="542725"/>
+            <a:off x="7569706" y="4318840"/>
+            <a:ext cx="474725" cy="479073"/>
           </a:xfrm>
           <a:prstGeom prst="straightConnector1">
             <a:avLst/>
@@ -4817,10 +5289,10 @@
       </p:cxnSp>
       <p:sp>
         <p:nvSpPr>
-          <p:cNvPr id="12" name="TextBox 11">
-            <a:extLst>
-              <a:ext uri="{FF2B5EF4-FFF2-40B4-BE49-F238E27FC236}">
-                <a16:creationId xmlns:a16="http://schemas.microsoft.com/office/drawing/2014/main" id="{C58C08AB-7977-05B9-B8B5-6108A7AA5B5C}"/>
+          <p:cNvPr id="16" name="TextBox 15">
+            <a:extLst>
+              <a:ext uri="{FF2B5EF4-FFF2-40B4-BE49-F238E27FC236}">
+                <a16:creationId xmlns:a16="http://schemas.microsoft.com/office/drawing/2014/main" id="{81E9BC92-BF4E-182E-5E04-1B4F85E48B24}"/>
               </a:ext>
             </a:extLst>
           </p:cNvPr>
@@ -4829,8 +5301,8 @@
         </p:nvSpPr>
         <p:spPr>
           <a:xfrm>
-            <a:off x="5183932" y="5836442"/>
-            <a:ext cx="2513254" cy="338554"/>
+            <a:off x="9108223" y="5165717"/>
+            <a:ext cx="2513254" cy="584775"/>
           </a:xfrm>
           <a:prstGeom prst="rect">
             <a:avLst/>
@@ -4845,134 +5317,14 @@
           <a:p>
             <a:r>
               <a:rPr lang="en-IN" sz="1600" dirty="0"/>
-              <a:t>Grammar check in reports</a:t>
-            </a:r>
-          </a:p>
-        </p:txBody>
-      </p:sp>
-      <p:pic>
-        <p:nvPicPr>
-          <p:cNvPr id="2058" name="Picture 10">
-            <a:extLst>
-              <a:ext uri="{FF2B5EF4-FFF2-40B4-BE49-F238E27FC236}">
-                <a16:creationId xmlns:a16="http://schemas.microsoft.com/office/drawing/2014/main" id="{68B658F5-F6C0-48DB-63B9-266A97F5CD12}"/>
-              </a:ext>
-            </a:extLst>
-          </p:cNvPr>
-          <p:cNvPicPr>
-            <a:picLocks noChangeAspect="1" noChangeArrowheads="1"/>
-          </p:cNvPicPr>
-          <p:nvPr/>
-        </p:nvPicPr>
-        <p:blipFill>
-          <a:blip r:embed="rId10">
-            <a:extLst>
-              <a:ext uri="{28A0092B-C50C-407E-A947-70E740481C1C}">
-                <a14:useLocalDpi xmlns:a14="http://schemas.microsoft.com/office/drawing/2010/main" val="0"/>
-              </a:ext>
-            </a:extLst>
-          </a:blip>
-          <a:srcRect/>
-          <a:stretch>
-            <a:fillRect/>
-          </a:stretch>
-        </p:blipFill>
-        <p:spPr bwMode="auto">
-          <a:xfrm>
-            <a:off x="8192081" y="4962998"/>
-            <a:ext cx="709255" cy="531942"/>
-          </a:xfrm>
-          <a:prstGeom prst="rect">
-            <a:avLst/>
-          </a:prstGeom>
-          <a:noFill/>
-          <a:extLst>
-            <a:ext uri="{909E8E84-426E-40DD-AFC4-6F175D3DCCD1}">
-              <a14:hiddenFill xmlns:a14="http://schemas.microsoft.com/office/drawing/2010/main">
-                <a:solidFill>
-                  <a:srgbClr val="FFFFFF"/>
-                </a:solidFill>
-              </a14:hiddenFill>
-            </a:ext>
-          </a:extLst>
-        </p:spPr>
-      </p:pic>
-      <p:cxnSp>
-        <p:nvCxnSpPr>
-          <p:cNvPr id="13" name="Straight Arrow Connector 12">
-            <a:extLst>
-              <a:ext uri="{FF2B5EF4-FFF2-40B4-BE49-F238E27FC236}">
-                <a16:creationId xmlns:a16="http://schemas.microsoft.com/office/drawing/2014/main" id="{4F57BE37-BC69-B1CB-F412-040D03D6E708}"/>
-              </a:ext>
-            </a:extLst>
-          </p:cNvPr>
-          <p:cNvCxnSpPr>
-            <a:cxnSpLocks/>
-          </p:cNvCxnSpPr>
-          <p:nvPr/>
-        </p:nvCxnSpPr>
-        <p:spPr>
-          <a:xfrm>
-            <a:off x="7569706" y="4318840"/>
-            <a:ext cx="474725" cy="479073"/>
-          </a:xfrm>
-          <a:prstGeom prst="straightConnector1">
-            <a:avLst/>
-          </a:prstGeom>
-          <a:ln>
-            <a:solidFill>
-              <a:schemeClr val="tx1"/>
-            </a:solidFill>
-            <a:headEnd type="triangle"/>
-            <a:tailEnd type="triangle"/>
-          </a:ln>
-        </p:spPr>
-        <p:style>
-          <a:lnRef idx="1">
-            <a:schemeClr val="accent1"/>
-          </a:lnRef>
-          <a:fillRef idx="0">
-            <a:schemeClr val="accent1"/>
-          </a:fillRef>
-          <a:effectRef idx="0">
-            <a:schemeClr val="accent1"/>
-          </a:effectRef>
-          <a:fontRef idx="minor">
-            <a:schemeClr val="tx1"/>
-          </a:fontRef>
-        </p:style>
-      </p:cxnSp>
-      <p:sp>
-        <p:nvSpPr>
-          <p:cNvPr id="16" name="TextBox 15">
-            <a:extLst>
-              <a:ext uri="{FF2B5EF4-FFF2-40B4-BE49-F238E27FC236}">
-                <a16:creationId xmlns:a16="http://schemas.microsoft.com/office/drawing/2014/main" id="{81E9BC92-BF4E-182E-5E04-1B4F85E48B24}"/>
-              </a:ext>
-            </a:extLst>
-          </p:cNvPr>
-          <p:cNvSpPr txBox="1"/>
-          <p:nvPr/>
-        </p:nvSpPr>
-        <p:spPr>
-          <a:xfrm>
-            <a:off x="9108223" y="5165717"/>
-            <a:ext cx="2513254" cy="338554"/>
-          </a:xfrm>
-          <a:prstGeom prst="rect">
-            <a:avLst/>
-          </a:prstGeom>
-          <a:noFill/>
-        </p:spPr>
-        <p:txBody>
-          <a:bodyPr wrap="square" rtlCol="0">
-            <a:spAutoFit/>
-          </a:bodyPr>
-          <a:lstStyle/>
-          <a:p>
-            <a:r>
+              <a:t>Password resets and alerts</a:t>
+            </a:r>
+            <a:br>
               <a:rPr lang="en-IN" sz="1600" dirty="0"/>
-              <a:t>Password resets and alerts</a:t>
+            </a:br>
+            <a:r>
+              <a:rPr lang="en-IN" sz="1600" dirty="0"/>
+              <a:t>JSON web tokens (JWT)</a:t>
             </a:r>
           </a:p>
         </p:txBody>

</xml_diff>